<commit_message>
Update Skin Preparation & Draping - 2025-08-08.pptx
</commit_message>
<xml_diff>
--- a/Skin Preparation & Draping - 2025-08-08.pptx
+++ b/Skin Preparation & Draping - 2025-08-08.pptx
@@ -11385,7 +11385,15 @@
             </a:r>
             <a:r>
               <a:rPr dirty="0"/>
-              <a:t> Broad spectrum, residual effect.</a:t>
+              <a:t> Broad</a:t>
+            </a:r>
+            <a:r>
+              <a:rPr lang="en-US" dirty="0"/>
+              <a:t>er</a:t>
+            </a:r>
+            <a:r>
+              <a:rPr dirty="0"/>
+              <a:t> spectrum.</a:t>
             </a:r>
           </a:p>
           <a:p>
@@ -11414,7 +11422,7 @@
             </a:r>
             <a:r>
               <a:rPr dirty="0"/>
-              <a:t> Broader spectrum than iodine, persistent activity, effective in presence of organic matter.</a:t>
+              <a:t> Broad spectrum, persistent activity, effective in presence of organic matter.</a:t>
             </a:r>
           </a:p>
           <a:p>

</xml_diff>